<commit_message>
update to week 5 SDA
</commit_message>
<xml_diff>
--- a/static/files/SDA/week5/lecture_week_5.pptx
+++ b/static/files/SDA/week5/lecture_week_5.pptx
@@ -33,7 +33,7 @@
     <p:sldId id="266" r:id="rId21"/>
     <p:sldId id="343" r:id="rId22"/>
   </p:sldIdLst>
-  <p:sldSz cx="9144000" cy="6858000" type="screen4x3"/>
+  <p:sldSz cx="12192000" cy="6858000"/>
   <p:notesSz cx="7099300" cy="10234613"/>
   <p:defaultTextStyle>
     <a:defPPr>
@@ -133,12 +133,12 @@
   <p:extLst>
     <p:ext uri="{EFAFB233-063F-42B5-8137-9DF3F51BA10A}">
       <p15:sldGuideLst xmlns:p15="http://schemas.microsoft.com/office/powerpoint/2012/main">
-        <p15:guide id="1" orient="horz" pos="2160">
+        <p15:guide id="1" orient="horz" pos="2160" userDrawn="1">
           <p15:clr>
             <a:srgbClr val="A4A3A4"/>
           </p15:clr>
         </p15:guide>
-        <p15:guide id="2" pos="2880">
+        <p15:guide id="2" pos="3840" userDrawn="1">
           <p15:clr>
             <a:srgbClr val="A4A3A4"/>
           </p15:clr>
@@ -234,7 +234,7 @@
           <a:p>
             <a:fld id="{3B8A617B-FAA8-1E48-8156-1D6172B8852C}" type="datetimeFigureOut">
               <a:rPr lang="nl-NL" smtClean="0"/>
-              <a:t>25-08-2023</a:t>
+              <a:t>2-10-2023</a:t>
             </a:fld>
             <a:endParaRPr lang="nl-NL"/>
           </a:p>
@@ -300,7 +300,7 @@
           <a:p>
             <a:fld id="{D27C5232-E044-E44C-8FF9-E90723E46FB4}" type="slidenum">
               <a:rPr lang="nl-NL" smtClean="0"/>
-              <a:t>‹nr.›</a:t>
+              <a:t>‹#›</a:t>
             </a:fld>
             <a:endParaRPr lang="nl-NL"/>
           </a:p>
@@ -399,7 +399,7 @@
           <a:p>
             <a:fld id="{56D60B32-5B67-473F-876B-A5A6D7E667CA}" type="datetimeFigureOut">
               <a:rPr lang="nl-NL" smtClean="0"/>
-              <a:t>25-08-2023</a:t>
+              <a:t>2-10-2023</a:t>
             </a:fld>
             <a:endParaRPr lang="nl-NL"/>
           </a:p>
@@ -417,8 +417,8 @@
         </p:nvSpPr>
         <p:spPr>
           <a:xfrm>
-            <a:off x="992188" y="768350"/>
-            <a:ext cx="5114925" cy="3836988"/>
+            <a:off x="139700" y="768350"/>
+            <a:ext cx="6819900" cy="3836988"/>
           </a:xfrm>
           <a:prstGeom prst="rect">
             <a:avLst/>
@@ -558,7 +558,7 @@
           <a:p>
             <a:fld id="{5E7434FA-B6DC-4B72-BAA4-3DD9D5C1E254}" type="slidenum">
               <a:rPr lang="nl-NL" smtClean="0"/>
-              <a:t>‹nr.›</a:t>
+              <a:t>‹#›</a:t>
             </a:fld>
             <a:endParaRPr lang="nl-NL"/>
           </a:p>
@@ -694,7 +694,12 @@
             <p:ph type="sldImg"/>
           </p:nvPr>
         </p:nvSpPr>
-        <p:spPr/>
+        <p:spPr>
+          <a:xfrm>
+            <a:off x="139700" y="768350"/>
+            <a:ext cx="6819900" cy="3836988"/>
+          </a:xfrm>
+        </p:spPr>
       </p:sp>
       <p:sp>
         <p:nvSpPr>
@@ -780,8 +785,8 @@
         </p:nvSpPr>
         <p:spPr>
           <a:xfrm>
-            <a:off x="685800" y="2130425"/>
-            <a:ext cx="7772400" cy="1470025"/>
+            <a:off x="914400" y="2130426"/>
+            <a:ext cx="10363200" cy="1470025"/>
           </a:xfrm>
         </p:spPr>
         <p:txBody>
@@ -808,8 +813,8 @@
         </p:nvSpPr>
         <p:spPr>
           <a:xfrm>
-            <a:off x="1371600" y="3886200"/>
-            <a:ext cx="6400800" cy="1752600"/>
+            <a:off x="1828800" y="3886200"/>
+            <a:ext cx="8534400" cy="1752600"/>
           </a:xfrm>
         </p:spPr>
         <p:txBody>
@@ -932,7 +937,7 @@
           <a:p>
             <a:fld id="{195EC7EE-1FA3-A547-B0AD-1B20D01AB2D7}" type="datetime1">
               <a:rPr lang="nl-NL" smtClean="0"/>
-              <a:t>25-08-2023</a:t>
+              <a:t>2-10-2023</a:t>
             </a:fld>
             <a:endParaRPr lang="nl-NL"/>
           </a:p>
@@ -974,7 +979,7 @@
           <a:p>
             <a:fld id="{020E0409-E04F-4430-A784-C1A9179F1034}" type="slidenum">
               <a:rPr lang="nl-NL" smtClean="0"/>
-              <a:t>‹nr.›</a:t>
+              <a:t>‹#›</a:t>
             </a:fld>
             <a:endParaRPr lang="nl-NL"/>
           </a:p>
@@ -1102,7 +1107,7 @@
           <a:p>
             <a:fld id="{270D9A64-97D9-2D43-9C88-501C444B6E84}" type="datetime1">
               <a:rPr lang="nl-NL" smtClean="0"/>
-              <a:t>25-08-2023</a:t>
+              <a:t>2-10-2023</a:t>
             </a:fld>
             <a:endParaRPr lang="nl-NL"/>
           </a:p>
@@ -1144,7 +1149,7 @@
           <a:p>
             <a:fld id="{020E0409-E04F-4430-A784-C1A9179F1034}" type="slidenum">
               <a:rPr lang="nl-NL" smtClean="0"/>
-              <a:t>‹nr.›</a:t>
+              <a:t>‹#›</a:t>
             </a:fld>
             <a:endParaRPr lang="nl-NL"/>
           </a:p>
@@ -1192,8 +1197,8 @@
         </p:nvSpPr>
         <p:spPr>
           <a:xfrm>
-            <a:off x="6629400" y="274638"/>
-            <a:ext cx="2057400" cy="5851525"/>
+            <a:off x="8839200" y="274639"/>
+            <a:ext cx="2743200" cy="5851525"/>
           </a:xfrm>
         </p:spPr>
         <p:txBody>
@@ -1220,8 +1225,8 @@
         </p:nvSpPr>
         <p:spPr>
           <a:xfrm>
-            <a:off x="457200" y="274638"/>
-            <a:ext cx="6019800" cy="5851525"/>
+            <a:off x="609600" y="274639"/>
+            <a:ext cx="8026400" cy="5851525"/>
           </a:xfrm>
         </p:spPr>
         <p:txBody>
@@ -1282,7 +1287,7 @@
           <a:p>
             <a:fld id="{C0DB5813-2B96-0642-847C-4D37EBCCA20C}" type="datetime1">
               <a:rPr lang="nl-NL" smtClean="0"/>
-              <a:t>25-08-2023</a:t>
+              <a:t>2-10-2023</a:t>
             </a:fld>
             <a:endParaRPr lang="nl-NL"/>
           </a:p>
@@ -1324,7 +1329,7 @@
           <a:p>
             <a:fld id="{020E0409-E04F-4430-A784-C1A9179F1034}" type="slidenum">
               <a:rPr lang="nl-NL" smtClean="0"/>
-              <a:t>‹nr.›</a:t>
+              <a:t>‹#›</a:t>
             </a:fld>
             <a:endParaRPr lang="nl-NL"/>
           </a:p>
@@ -1452,7 +1457,7 @@
           <a:p>
             <a:fld id="{439814C6-EC19-3C40-B251-65022B811312}" type="datetime1">
               <a:rPr lang="nl-NL" smtClean="0"/>
-              <a:t>25-08-2023</a:t>
+              <a:t>2-10-2023</a:t>
             </a:fld>
             <a:endParaRPr lang="nl-NL"/>
           </a:p>
@@ -1494,7 +1499,7 @@
           <a:p>
             <a:fld id="{020E0409-E04F-4430-A784-C1A9179F1034}" type="slidenum">
               <a:rPr lang="nl-NL" smtClean="0"/>
-              <a:t>‹nr.›</a:t>
+              <a:t>‹#›</a:t>
             </a:fld>
             <a:endParaRPr lang="nl-NL"/>
           </a:p>
@@ -1542,8 +1547,8 @@
         </p:nvSpPr>
         <p:spPr>
           <a:xfrm>
-            <a:off x="722313" y="4406900"/>
-            <a:ext cx="7772400" cy="1362075"/>
+            <a:off x="963084" y="4406901"/>
+            <a:ext cx="10363200" cy="1362075"/>
           </a:xfrm>
         </p:spPr>
         <p:txBody>
@@ -1574,8 +1579,8 @@
         </p:nvSpPr>
         <p:spPr>
           <a:xfrm>
-            <a:off x="722313" y="2906713"/>
-            <a:ext cx="7772400" cy="1500187"/>
+            <a:off x="963084" y="2906713"/>
+            <a:ext cx="10363200" cy="1500187"/>
           </a:xfrm>
         </p:spPr>
         <p:txBody>
@@ -1698,7 +1703,7 @@
           <a:p>
             <a:fld id="{6B61BD80-E3A8-5F44-924E-39E96A33997F}" type="datetime1">
               <a:rPr lang="nl-NL" smtClean="0"/>
-              <a:t>25-08-2023</a:t>
+              <a:t>2-10-2023</a:t>
             </a:fld>
             <a:endParaRPr lang="nl-NL"/>
           </a:p>
@@ -1740,7 +1745,7 @@
           <a:p>
             <a:fld id="{020E0409-E04F-4430-A784-C1A9179F1034}" type="slidenum">
               <a:rPr lang="nl-NL" smtClean="0"/>
-              <a:t>‹nr.›</a:t>
+              <a:t>‹#›</a:t>
             </a:fld>
             <a:endParaRPr lang="nl-NL"/>
           </a:p>
@@ -1811,8 +1816,8 @@
         </p:nvSpPr>
         <p:spPr>
           <a:xfrm>
-            <a:off x="457200" y="1600200"/>
-            <a:ext cx="4038600" cy="4525963"/>
+            <a:off x="609600" y="1600201"/>
+            <a:ext cx="5384800" cy="4525963"/>
           </a:xfrm>
         </p:spPr>
         <p:txBody>
@@ -1896,8 +1901,8 @@
         </p:nvSpPr>
         <p:spPr>
           <a:xfrm>
-            <a:off x="4648200" y="1600200"/>
-            <a:ext cx="4038600" cy="4525963"/>
+            <a:off x="6197600" y="1600201"/>
+            <a:ext cx="5384800" cy="4525963"/>
           </a:xfrm>
         </p:spPr>
         <p:txBody>
@@ -1986,7 +1991,7 @@
           <a:p>
             <a:fld id="{E9E8C907-2DC5-DF4D-B001-C5B05E023ADE}" type="datetime1">
               <a:rPr lang="nl-NL" smtClean="0"/>
-              <a:t>25-08-2023</a:t>
+              <a:t>2-10-2023</a:t>
             </a:fld>
             <a:endParaRPr lang="nl-NL"/>
           </a:p>
@@ -2028,7 +2033,7 @@
           <a:p>
             <a:fld id="{020E0409-E04F-4430-A784-C1A9179F1034}" type="slidenum">
               <a:rPr lang="nl-NL" smtClean="0"/>
-              <a:t>‹nr.›</a:t>
+              <a:t>‹#›</a:t>
             </a:fld>
             <a:endParaRPr lang="nl-NL"/>
           </a:p>
@@ -2103,8 +2108,8 @@
         </p:nvSpPr>
         <p:spPr>
           <a:xfrm>
-            <a:off x="457200" y="1535113"/>
-            <a:ext cx="4040188" cy="639762"/>
+            <a:off x="609600" y="1535113"/>
+            <a:ext cx="5386917" cy="639762"/>
           </a:xfrm>
         </p:spPr>
         <p:txBody>
@@ -2168,8 +2173,8 @@
         </p:nvSpPr>
         <p:spPr>
           <a:xfrm>
-            <a:off x="457200" y="2174875"/>
-            <a:ext cx="4040188" cy="3951288"/>
+            <a:off x="609600" y="2174875"/>
+            <a:ext cx="5386917" cy="3951288"/>
           </a:xfrm>
         </p:spPr>
         <p:txBody>
@@ -2253,8 +2258,8 @@
         </p:nvSpPr>
         <p:spPr>
           <a:xfrm>
-            <a:off x="4645025" y="1535113"/>
-            <a:ext cx="4041775" cy="639762"/>
+            <a:off x="6193368" y="1535113"/>
+            <a:ext cx="5389033" cy="639762"/>
           </a:xfrm>
         </p:spPr>
         <p:txBody>
@@ -2318,8 +2323,8 @@
         </p:nvSpPr>
         <p:spPr>
           <a:xfrm>
-            <a:off x="4645025" y="2174875"/>
-            <a:ext cx="4041775" cy="3951288"/>
+            <a:off x="6193368" y="2174875"/>
+            <a:ext cx="5389033" cy="3951288"/>
           </a:xfrm>
         </p:spPr>
         <p:txBody>
@@ -2408,7 +2413,7 @@
           <a:p>
             <a:fld id="{F58EC84D-735C-9C47-936C-433C1FDD2406}" type="datetime1">
               <a:rPr lang="nl-NL" smtClean="0"/>
-              <a:t>25-08-2023</a:t>
+              <a:t>2-10-2023</a:t>
             </a:fld>
             <a:endParaRPr lang="nl-NL"/>
           </a:p>
@@ -2450,7 +2455,7 @@
           <a:p>
             <a:fld id="{020E0409-E04F-4430-A784-C1A9179F1034}" type="slidenum">
               <a:rPr lang="nl-NL" smtClean="0"/>
-              <a:t>‹nr.›</a:t>
+              <a:t>‹#›</a:t>
             </a:fld>
             <a:endParaRPr lang="nl-NL"/>
           </a:p>
@@ -2526,7 +2531,7 @@
           <a:p>
             <a:fld id="{607132DF-B754-2C40-ABBC-1487DD57F43D}" type="datetime1">
               <a:rPr lang="nl-NL" smtClean="0"/>
-              <a:t>25-08-2023</a:t>
+              <a:t>2-10-2023</a:t>
             </a:fld>
             <a:endParaRPr lang="nl-NL"/>
           </a:p>
@@ -2568,7 +2573,7 @@
           <a:p>
             <a:fld id="{020E0409-E04F-4430-A784-C1A9179F1034}" type="slidenum">
               <a:rPr lang="nl-NL" smtClean="0"/>
-              <a:t>‹nr.›</a:t>
+              <a:t>‹#›</a:t>
             </a:fld>
             <a:endParaRPr lang="nl-NL"/>
           </a:p>
@@ -2621,7 +2626,7 @@
           <a:p>
             <a:fld id="{7389D038-1725-EB43-9218-4BE590D875B0}" type="datetime1">
               <a:rPr lang="nl-NL" smtClean="0"/>
-              <a:t>25-08-2023</a:t>
+              <a:t>2-10-2023</a:t>
             </a:fld>
             <a:endParaRPr lang="nl-NL"/>
           </a:p>
@@ -2663,7 +2668,7 @@
           <a:p>
             <a:fld id="{020E0409-E04F-4430-A784-C1A9179F1034}" type="slidenum">
               <a:rPr lang="nl-NL" smtClean="0"/>
-              <a:t>‹nr.›</a:t>
+              <a:t>‹#›</a:t>
             </a:fld>
             <a:endParaRPr lang="nl-NL"/>
           </a:p>
@@ -2711,8 +2716,8 @@
         </p:nvSpPr>
         <p:spPr>
           <a:xfrm>
-            <a:off x="457200" y="273050"/>
-            <a:ext cx="3008313" cy="1162050"/>
+            <a:off x="609601" y="273050"/>
+            <a:ext cx="4011084" cy="1162050"/>
           </a:xfrm>
         </p:spPr>
         <p:txBody>
@@ -2743,8 +2748,8 @@
         </p:nvSpPr>
         <p:spPr>
           <a:xfrm>
-            <a:off x="3575050" y="273050"/>
-            <a:ext cx="5111750" cy="5853113"/>
+            <a:off x="4766733" y="273051"/>
+            <a:ext cx="6815667" cy="5853113"/>
           </a:xfrm>
         </p:spPr>
         <p:txBody>
@@ -2828,8 +2833,8 @@
         </p:nvSpPr>
         <p:spPr>
           <a:xfrm>
-            <a:off x="457200" y="1435100"/>
-            <a:ext cx="3008313" cy="4691063"/>
+            <a:off x="609601" y="1435101"/>
+            <a:ext cx="4011084" cy="4691063"/>
           </a:xfrm>
         </p:spPr>
         <p:txBody>
@@ -2898,7 +2903,7 @@
           <a:p>
             <a:fld id="{A2CD003A-446F-8148-BF9C-AE5CD7D09749}" type="datetime1">
               <a:rPr lang="nl-NL" smtClean="0"/>
-              <a:t>25-08-2023</a:t>
+              <a:t>2-10-2023</a:t>
             </a:fld>
             <a:endParaRPr lang="nl-NL"/>
           </a:p>
@@ -2940,7 +2945,7 @@
           <a:p>
             <a:fld id="{020E0409-E04F-4430-A784-C1A9179F1034}" type="slidenum">
               <a:rPr lang="nl-NL" smtClean="0"/>
-              <a:t>‹nr.›</a:t>
+              <a:t>‹#›</a:t>
             </a:fld>
             <a:endParaRPr lang="nl-NL"/>
           </a:p>
@@ -2988,8 +2993,8 @@
         </p:nvSpPr>
         <p:spPr>
           <a:xfrm>
-            <a:off x="1792288" y="4800600"/>
-            <a:ext cx="5486400" cy="566738"/>
+            <a:off x="2389717" y="4800600"/>
+            <a:ext cx="7315200" cy="566738"/>
           </a:xfrm>
         </p:spPr>
         <p:txBody>
@@ -3020,8 +3025,8 @@
         </p:nvSpPr>
         <p:spPr>
           <a:xfrm>
-            <a:off x="1792288" y="612775"/>
-            <a:ext cx="5486400" cy="4114800"/>
+            <a:off x="2389717" y="612775"/>
+            <a:ext cx="7315200" cy="4114800"/>
           </a:xfrm>
         </p:spPr>
         <p:txBody>
@@ -3081,8 +3086,8 @@
         </p:nvSpPr>
         <p:spPr>
           <a:xfrm>
-            <a:off x="1792288" y="5367338"/>
-            <a:ext cx="5486400" cy="804862"/>
+            <a:off x="2389717" y="5367338"/>
+            <a:ext cx="7315200" cy="804862"/>
           </a:xfrm>
         </p:spPr>
         <p:txBody>
@@ -3151,7 +3156,7 @@
           <a:p>
             <a:fld id="{3DF0C36C-B394-1D48-9D1C-05A66426F65E}" type="datetime1">
               <a:rPr lang="nl-NL" smtClean="0"/>
-              <a:t>25-08-2023</a:t>
+              <a:t>2-10-2023</a:t>
             </a:fld>
             <a:endParaRPr lang="nl-NL"/>
           </a:p>
@@ -3193,7 +3198,7 @@
           <a:p>
             <a:fld id="{020E0409-E04F-4430-A784-C1A9179F1034}" type="slidenum">
               <a:rPr lang="nl-NL" smtClean="0"/>
-              <a:t>‹nr.›</a:t>
+              <a:t>‹#›</a:t>
             </a:fld>
             <a:endParaRPr lang="nl-NL"/>
           </a:p>
@@ -3246,8 +3251,8 @@
         </p:nvSpPr>
         <p:spPr>
           <a:xfrm>
-            <a:off x="457200" y="274638"/>
-            <a:ext cx="8229600" cy="1143000"/>
+            <a:off x="609600" y="274638"/>
+            <a:ext cx="10972800" cy="1143000"/>
           </a:xfrm>
           <a:prstGeom prst="rect">
             <a:avLst/>
@@ -3279,8 +3284,8 @@
         </p:nvSpPr>
         <p:spPr>
           <a:xfrm>
-            <a:off x="457200" y="1600200"/>
-            <a:ext cx="8229600" cy="4525963"/>
+            <a:off x="609600" y="1600201"/>
+            <a:ext cx="10972800" cy="4525963"/>
           </a:xfrm>
           <a:prstGeom prst="rect">
             <a:avLst/>
@@ -3341,8 +3346,8 @@
         </p:nvSpPr>
         <p:spPr>
           <a:xfrm>
-            <a:off x="457200" y="6356350"/>
-            <a:ext cx="2133600" cy="365125"/>
+            <a:off x="609600" y="6356351"/>
+            <a:ext cx="2844800" cy="365125"/>
           </a:xfrm>
           <a:prstGeom prst="rect">
             <a:avLst/>
@@ -3364,7 +3369,7 @@
           <a:p>
             <a:fld id="{82EF86E6-8E6D-9F45-AD74-23EA88EE15FD}" type="datetime1">
               <a:rPr lang="nl-NL" smtClean="0"/>
-              <a:t>25-08-2023</a:t>
+              <a:t>2-10-2023</a:t>
             </a:fld>
             <a:endParaRPr lang="nl-NL"/>
           </a:p>
@@ -3382,8 +3387,8 @@
         </p:nvSpPr>
         <p:spPr>
           <a:xfrm>
-            <a:off x="3124200" y="6356350"/>
-            <a:ext cx="2895600" cy="365125"/>
+            <a:off x="4165600" y="6356351"/>
+            <a:ext cx="3860800" cy="365125"/>
           </a:xfrm>
           <a:prstGeom prst="rect">
             <a:avLst/>
@@ -3419,8 +3424,8 @@
         </p:nvSpPr>
         <p:spPr>
           <a:xfrm>
-            <a:off x="6553200" y="6356350"/>
-            <a:ext cx="2133600" cy="365125"/>
+            <a:off x="8737600" y="6356351"/>
+            <a:ext cx="2844800" cy="365125"/>
           </a:xfrm>
           <a:prstGeom prst="rect">
             <a:avLst/>
@@ -3442,7 +3447,7 @@
           <a:p>
             <a:fld id="{020E0409-E04F-4430-A784-C1A9179F1034}" type="slidenum">
               <a:rPr lang="nl-NL" smtClean="0"/>
-              <a:t>‹nr.›</a:t>
+              <a:t>‹#›</a:t>
             </a:fld>
             <a:endParaRPr lang="nl-NL"/>
           </a:p>
@@ -3752,7 +3757,7 @@
         </p:nvSpPr>
         <p:spPr>
           <a:xfrm>
-            <a:off x="683568" y="2132856"/>
+            <a:off x="2207568" y="2132857"/>
             <a:ext cx="7772400" cy="1470025"/>
           </a:xfrm>
         </p:spPr>
@@ -3796,7 +3801,7 @@
         </p:nvSpPr>
         <p:spPr>
           <a:xfrm>
-            <a:off x="1369368" y="4584561"/>
+            <a:off x="2893368" y="4584561"/>
             <a:ext cx="6400800" cy="1752600"/>
           </a:xfrm>
         </p:spPr>
@@ -3869,8 +3874,8 @@
           <a:chExt cx="0" cy="0"/>
         </a:xfrm>
       </p:grpSpPr>
-      <mc:AlternateContent xmlns:mc="http://schemas.openxmlformats.org/markup-compatibility/2006" xmlns:a14="http://schemas.microsoft.com/office/drawing/2010/main">
-        <mc:Choice Requires="a14">
+      <mc:AlternateContent xmlns:mc="http://schemas.openxmlformats.org/markup-compatibility/2006">
+        <mc:Choice xmlns:a14="http://schemas.microsoft.com/office/drawing/2010/main" Requires="a14">
           <p:sp>
             <p:nvSpPr>
               <p:cNvPr id="3" name="Tijdelijke aanduiding voor inhoud 2"/>
@@ -3884,7 +3889,7 @@
             <p:spPr/>
             <p:txBody>
               <a:bodyPr>
-                <a:normAutofit fontScale="92500" lnSpcReduction="10000"/>
+                <a:normAutofit lnSpcReduction="10000"/>
               </a:bodyPr>
               <a:lstStyle/>
               <a:p>
@@ -4273,7 +4278,7 @@
             </p:txBody>
           </p:sp>
         </mc:Choice>
-        <mc:Fallback xmlns="">
+        <mc:Fallback>
           <p:sp>
             <p:nvSpPr>
               <p:cNvPr id="3" name="Tijdelijke aanduiding voor inhoud 2"/>
@@ -4288,7 +4293,7 @@
               <a:blipFill>
                 <a:blip r:embed="rId2"/>
                 <a:stretch>
-                  <a:fillRect l="-1698" t="-2521" r="-154" b="-10364"/>
+                  <a:fillRect l="-1278" t="-2830"/>
                 </a:stretch>
               </a:blipFill>
             </p:spPr>
@@ -4404,7 +4409,7 @@
         <p:spPr/>
         <p:txBody>
           <a:bodyPr>
-            <a:normAutofit fontScale="90000"/>
+            <a:normAutofit/>
           </a:bodyPr>
           <a:lstStyle/>
           <a:p>
@@ -4461,7 +4466,7 @@
         <p:spPr/>
         <p:txBody>
           <a:bodyPr>
-            <a:normAutofit fontScale="92500" lnSpcReduction="10000"/>
+            <a:normAutofit/>
           </a:bodyPr>
           <a:lstStyle/>
           <a:p>
@@ -5133,7 +5138,7 @@
         </p:blipFill>
         <p:spPr bwMode="auto">
           <a:xfrm>
-            <a:off x="1" y="2045664"/>
+            <a:off x="1524001" y="2045664"/>
             <a:ext cx="6588578" cy="4071938"/>
           </a:xfrm>
           <a:prstGeom prst="rect">
@@ -5145,14 +5150,14 @@
           </a:ln>
           <a:extLst>
             <a:ext uri="{909E8E84-426E-40dd-AFC4-6F175D3DCCD1}">
-              <a14:hiddenFill xmlns:a14="http://schemas.microsoft.com/office/drawing/2010/main" xmlns="">
+              <a14:hiddenFill xmlns="" xmlns:a14="http://schemas.microsoft.com/office/drawing/2010/main">
                 <a:solidFill>
                   <a:schemeClr val="accent1"/>
                 </a:solidFill>
               </a14:hiddenFill>
             </a:ext>
             <a:ext uri="{91240B29-F687-4f45-9708-019B960494DF}">
-              <a14:hiddenLine xmlns:a14="http://schemas.microsoft.com/office/drawing/2010/main" xmlns="" w="9525">
+              <a14:hiddenLine xmlns="" xmlns:a14="http://schemas.microsoft.com/office/drawing/2010/main" w="9525">
                 <a:solidFill>
                   <a:schemeClr val="tx1"/>
                 </a:solidFill>
@@ -5172,7 +5177,7 @@
         </p:nvSpPr>
         <p:spPr>
           <a:xfrm>
-            <a:off x="5984748" y="2125266"/>
+            <a:off x="7508748" y="2125267"/>
             <a:ext cx="2530602" cy="3693319"/>
           </a:xfrm>
           <a:prstGeom prst="rect">
@@ -5374,7 +5379,7 @@
         </p:blipFill>
         <p:spPr bwMode="auto">
           <a:xfrm>
-            <a:off x="0" y="1784082"/>
+            <a:off x="1524000" y="1784083"/>
             <a:ext cx="4906736" cy="4089943"/>
           </a:xfrm>
           <a:prstGeom prst="rect">
@@ -5386,14 +5391,14 @@
           </a:ln>
           <a:extLst>
             <a:ext uri="{909E8E84-426E-40dd-AFC4-6F175D3DCCD1}">
-              <a14:hiddenFill xmlns:a14="http://schemas.microsoft.com/office/drawing/2010/main" xmlns="">
+              <a14:hiddenFill xmlns="" xmlns:a14="http://schemas.microsoft.com/office/drawing/2010/main">
                 <a:solidFill>
                   <a:schemeClr val="accent1"/>
                 </a:solidFill>
               </a14:hiddenFill>
             </a:ext>
             <a:ext uri="{91240B29-F687-4f45-9708-019B960494DF}">
-              <a14:hiddenLine xmlns:a14="http://schemas.microsoft.com/office/drawing/2010/main" xmlns="" w="9525">
+              <a14:hiddenLine xmlns="" xmlns:a14="http://schemas.microsoft.com/office/drawing/2010/main" w="9525">
                 <a:solidFill>
                   <a:schemeClr val="tx1"/>
                 </a:solidFill>
@@ -5436,7 +5441,7 @@
         </p:nvSpPr>
         <p:spPr>
           <a:xfrm>
-            <a:off x="4653642" y="2125266"/>
+            <a:off x="6177642" y="2125266"/>
             <a:ext cx="4490358" cy="2793072"/>
           </a:xfrm>
           <a:prstGeom prst="rect">
@@ -5568,7 +5573,7 @@
         </p:blipFill>
         <p:spPr bwMode="auto">
           <a:xfrm>
-            <a:off x="0" y="1784082"/>
+            <a:off x="1524000" y="1784083"/>
             <a:ext cx="4906736" cy="4089943"/>
           </a:xfrm>
           <a:prstGeom prst="rect">
@@ -5580,14 +5585,14 @@
           </a:ln>
           <a:extLst>
             <a:ext uri="{909E8E84-426E-40dd-AFC4-6F175D3DCCD1}">
-              <a14:hiddenFill xmlns:a14="http://schemas.microsoft.com/office/drawing/2010/main" xmlns="">
+              <a14:hiddenFill xmlns="" xmlns:a14="http://schemas.microsoft.com/office/drawing/2010/main">
                 <a:solidFill>
                   <a:schemeClr val="accent1"/>
                 </a:solidFill>
               </a14:hiddenFill>
             </a:ext>
             <a:ext uri="{91240B29-F687-4f45-9708-019B960494DF}">
-              <a14:hiddenLine xmlns:a14="http://schemas.microsoft.com/office/drawing/2010/main" xmlns="" w="9525">
+              <a14:hiddenLine xmlns="" xmlns:a14="http://schemas.microsoft.com/office/drawing/2010/main" w="9525">
                 <a:solidFill>
                   <a:schemeClr val="tx1"/>
                 </a:solidFill>
@@ -5630,7 +5635,7 @@
         </p:nvSpPr>
         <p:spPr>
           <a:xfrm>
-            <a:off x="3845378" y="2091231"/>
+            <a:off x="5369379" y="2091232"/>
             <a:ext cx="4531179" cy="1131079"/>
           </a:xfrm>
           <a:prstGeom prst="rect">
@@ -5699,7 +5704,7 @@
         </p:nvCxnSpPr>
         <p:spPr>
           <a:xfrm flipV="1">
-            <a:off x="6662057" y="2645228"/>
+            <a:off x="8186058" y="2645228"/>
             <a:ext cx="8165" cy="449532"/>
           </a:xfrm>
           <a:prstGeom prst="straightConnector1">
@@ -5732,7 +5737,7 @@
         </p:nvSpPr>
         <p:spPr>
           <a:xfrm>
-            <a:off x="3845378" y="4008868"/>
+            <a:off x="5369378" y="4008869"/>
             <a:ext cx="4572000" cy="1131079"/>
           </a:xfrm>
           <a:prstGeom prst="rect">
@@ -5924,7 +5929,7 @@
         </p:blipFill>
         <p:spPr bwMode="auto">
           <a:xfrm>
-            <a:off x="0" y="1784082"/>
+            <a:off x="1524000" y="1784083"/>
             <a:ext cx="4906736" cy="4089943"/>
           </a:xfrm>
           <a:prstGeom prst="rect">
@@ -5936,14 +5941,14 @@
           </a:ln>
           <a:extLst>
             <a:ext uri="{909E8E84-426E-40dd-AFC4-6F175D3DCCD1}">
-              <a14:hiddenFill xmlns:a14="http://schemas.microsoft.com/office/drawing/2010/main" xmlns="">
+              <a14:hiddenFill xmlns="" xmlns:a14="http://schemas.microsoft.com/office/drawing/2010/main">
                 <a:solidFill>
                   <a:schemeClr val="accent1"/>
                 </a:solidFill>
               </a14:hiddenFill>
             </a:ext>
             <a:ext uri="{91240B29-F687-4f45-9708-019B960494DF}">
-              <a14:hiddenLine xmlns:a14="http://schemas.microsoft.com/office/drawing/2010/main" xmlns="" w="9525">
+              <a14:hiddenLine xmlns="" xmlns:a14="http://schemas.microsoft.com/office/drawing/2010/main" w="9525">
                 <a:solidFill>
                   <a:schemeClr val="tx1"/>
                 </a:solidFill>
@@ -5986,7 +5991,7 @@
         </p:nvSpPr>
         <p:spPr>
           <a:xfrm>
-            <a:off x="3812720" y="3415222"/>
+            <a:off x="5336720" y="3415222"/>
             <a:ext cx="4490358" cy="923330"/>
           </a:xfrm>
           <a:prstGeom prst="rect">
@@ -6053,7 +6058,7 @@
         </p:nvCxnSpPr>
         <p:spPr>
           <a:xfrm flipV="1">
-            <a:off x="6662057" y="2645228"/>
+            <a:off x="8186058" y="2645228"/>
             <a:ext cx="8165" cy="449532"/>
           </a:xfrm>
           <a:prstGeom prst="straightConnector1">
@@ -6086,7 +6091,7 @@
         </p:nvSpPr>
         <p:spPr>
           <a:xfrm>
-            <a:off x="3812720" y="2164378"/>
+            <a:off x="5336720" y="2164379"/>
             <a:ext cx="4490358" cy="1131079"/>
           </a:xfrm>
           <a:prstGeom prst="rect">
@@ -6282,7 +6287,7 @@
         </p:blipFill>
         <p:spPr bwMode="auto">
           <a:xfrm>
-            <a:off x="0" y="1784082"/>
+            <a:off x="1524000" y="1784083"/>
             <a:ext cx="4906736" cy="4089943"/>
           </a:xfrm>
           <a:prstGeom prst="rect">
@@ -6294,14 +6299,14 @@
           </a:ln>
           <a:extLst>
             <a:ext uri="{909E8E84-426E-40dd-AFC4-6F175D3DCCD1}">
-              <a14:hiddenFill xmlns:a14="http://schemas.microsoft.com/office/drawing/2010/main" xmlns="">
+              <a14:hiddenFill xmlns="" xmlns:a14="http://schemas.microsoft.com/office/drawing/2010/main">
                 <a:solidFill>
                   <a:schemeClr val="accent1"/>
                 </a:solidFill>
               </a14:hiddenFill>
             </a:ext>
             <a:ext uri="{91240B29-F687-4f45-9708-019B960494DF}">
-              <a14:hiddenLine xmlns:a14="http://schemas.microsoft.com/office/drawing/2010/main" xmlns="" w="9525">
+              <a14:hiddenLine xmlns="" xmlns:a14="http://schemas.microsoft.com/office/drawing/2010/main" w="9525">
                 <a:solidFill>
                   <a:schemeClr val="tx1"/>
                 </a:solidFill>
@@ -6326,7 +6331,7 @@
         <p:spPr/>
         <p:txBody>
           <a:bodyPr>
-            <a:normAutofit fontScale="90000"/>
+            <a:normAutofit/>
           </a:bodyPr>
           <a:lstStyle/>
           <a:p>
@@ -6346,7 +6351,7 @@
         </p:nvSpPr>
         <p:spPr>
           <a:xfrm>
-            <a:off x="3812720" y="3211610"/>
+            <a:off x="5336720" y="3211610"/>
             <a:ext cx="4490358" cy="923330"/>
           </a:xfrm>
           <a:prstGeom prst="rect">
@@ -6413,7 +6418,7 @@
         </p:nvCxnSpPr>
         <p:spPr>
           <a:xfrm flipV="1">
-            <a:off x="6662057" y="2645228"/>
+            <a:off x="8186058" y="2645228"/>
             <a:ext cx="8165" cy="449532"/>
           </a:xfrm>
           <a:prstGeom prst="straightConnector1">
@@ -6446,7 +6451,7 @@
         </p:nvSpPr>
         <p:spPr>
           <a:xfrm>
-            <a:off x="3812720" y="2164377"/>
+            <a:off x="5336720" y="2164377"/>
             <a:ext cx="4490358" cy="923330"/>
           </a:xfrm>
           <a:prstGeom prst="rect">
@@ -6515,7 +6520,7 @@
         </p:nvSpPr>
         <p:spPr>
           <a:xfrm>
-            <a:off x="3812720" y="4111857"/>
+            <a:off x="5336720" y="4111857"/>
             <a:ext cx="4490358" cy="1754326"/>
           </a:xfrm>
           <a:prstGeom prst="rect">
@@ -6759,7 +6764,7 @@
         </p:blipFill>
         <p:spPr bwMode="auto">
           <a:xfrm>
-            <a:off x="0" y="1784082"/>
+            <a:off x="1524000" y="1784083"/>
             <a:ext cx="4906736" cy="4089943"/>
           </a:xfrm>
           <a:prstGeom prst="rect">
@@ -6771,14 +6776,14 @@
           </a:ln>
           <a:extLst>
             <a:ext uri="{909E8E84-426E-40dd-AFC4-6F175D3DCCD1}">
-              <a14:hiddenFill xmlns:a14="http://schemas.microsoft.com/office/drawing/2010/main" xmlns="">
+              <a14:hiddenFill xmlns="" xmlns:a14="http://schemas.microsoft.com/office/drawing/2010/main">
                 <a:solidFill>
                   <a:schemeClr val="accent1"/>
                 </a:solidFill>
               </a14:hiddenFill>
             </a:ext>
             <a:ext uri="{91240B29-F687-4f45-9708-019B960494DF}">
-              <a14:hiddenLine xmlns:a14="http://schemas.microsoft.com/office/drawing/2010/main" xmlns="" w="9525">
+              <a14:hiddenLine xmlns="" xmlns:a14="http://schemas.microsoft.com/office/drawing/2010/main" w="9525">
                 <a:solidFill>
                   <a:schemeClr val="tx1"/>
                 </a:solidFill>
@@ -6803,7 +6808,7 @@
         <p:spPr/>
         <p:txBody>
           <a:bodyPr>
-            <a:normAutofit fontScale="90000"/>
+            <a:normAutofit/>
           </a:bodyPr>
           <a:lstStyle/>
           <a:p>
@@ -6823,7 +6828,7 @@
         </p:nvCxnSpPr>
         <p:spPr>
           <a:xfrm flipV="1">
-            <a:off x="6662057" y="2645228"/>
+            <a:off x="8186058" y="2645228"/>
             <a:ext cx="8165" cy="449532"/>
           </a:xfrm>
           <a:prstGeom prst="straightConnector1">
@@ -6856,7 +6861,7 @@
         </p:nvSpPr>
         <p:spPr>
           <a:xfrm>
-            <a:off x="3812720" y="2164378"/>
+            <a:off x="5336721" y="2164379"/>
             <a:ext cx="5275621" cy="507831"/>
           </a:xfrm>
           <a:prstGeom prst="rect">
@@ -6937,7 +6942,7 @@
         </p:nvSpPr>
         <p:spPr>
           <a:xfrm>
-            <a:off x="3812720" y="4111857"/>
+            <a:off x="5336721" y="4111857"/>
             <a:ext cx="5149745" cy="1754326"/>
           </a:xfrm>
           <a:prstGeom prst="rect">
@@ -7397,7 +7402,7 @@
         </p:nvSpPr>
         <p:spPr>
           <a:xfrm>
-            <a:off x="457200" y="1600200"/>
+            <a:off x="1981200" y="1600201"/>
             <a:ext cx="8507288" cy="4525963"/>
           </a:xfrm>
         </p:spPr>
@@ -7563,7 +7568,7 @@
         </p:nvSpPr>
         <p:spPr>
           <a:xfrm>
-            <a:off x="628650" y="1894115"/>
+            <a:off x="2152651" y="1894115"/>
             <a:ext cx="3572729" cy="3595858"/>
           </a:xfrm>
         </p:spPr>
@@ -7611,7 +7616,7 @@
         </p:blipFill>
         <p:spPr bwMode="auto">
           <a:xfrm>
-            <a:off x="1" y="2930978"/>
+            <a:off x="1524001" y="2930979"/>
             <a:ext cx="4415264" cy="3069771"/>
           </a:xfrm>
           <a:prstGeom prst="rect">
@@ -7623,14 +7628,14 @@
           </a:ln>
           <a:extLst>
             <a:ext uri="{909E8E84-426E-40dd-AFC4-6F175D3DCCD1}">
-              <a14:hiddenFill xmlns:a14="http://schemas.microsoft.com/office/drawing/2010/main" xmlns="">
+              <a14:hiddenFill xmlns="" xmlns:a14="http://schemas.microsoft.com/office/drawing/2010/main">
                 <a:solidFill>
                   <a:schemeClr val="accent1"/>
                 </a:solidFill>
               </a14:hiddenFill>
             </a:ext>
             <a:ext uri="{91240B29-F687-4f45-9708-019B960494DF}">
-              <a14:hiddenLine xmlns:a14="http://schemas.microsoft.com/office/drawing/2010/main" xmlns="" w="9525">
+              <a14:hiddenLine xmlns="" xmlns:a14="http://schemas.microsoft.com/office/drawing/2010/main" w="9525">
                 <a:solidFill>
                   <a:schemeClr val="tx1"/>
                 </a:solidFill>
@@ -7665,7 +7670,7 @@
         </p:blipFill>
         <p:spPr bwMode="auto">
           <a:xfrm>
-            <a:off x="4201378" y="2930979"/>
+            <a:off x="5725378" y="2930979"/>
             <a:ext cx="4415264" cy="3069770"/>
           </a:xfrm>
           <a:prstGeom prst="rect">
@@ -7677,14 +7682,14 @@
           </a:ln>
           <a:extLst>
             <a:ext uri="{909E8E84-426E-40dd-AFC4-6F175D3DCCD1}">
-              <a14:hiddenFill xmlns:a14="http://schemas.microsoft.com/office/drawing/2010/main" xmlns="">
+              <a14:hiddenFill xmlns="" xmlns:a14="http://schemas.microsoft.com/office/drawing/2010/main">
                 <a:solidFill>
                   <a:schemeClr val="accent1"/>
                 </a:solidFill>
               </a14:hiddenFill>
             </a:ext>
             <a:ext uri="{91240B29-F687-4f45-9708-019B960494DF}">
-              <a14:hiddenLine xmlns:a14="http://schemas.microsoft.com/office/drawing/2010/main" xmlns="" w="9525">
+              <a14:hiddenLine xmlns="" xmlns:a14="http://schemas.microsoft.com/office/drawing/2010/main" w="9525">
                 <a:solidFill>
                   <a:schemeClr val="tx1"/>
                 </a:solidFill>
@@ -7706,7 +7711,7 @@
         </p:nvSpPr>
         <p:spPr>
           <a:xfrm>
-            <a:off x="4482193" y="1894115"/>
+            <a:off x="6006194" y="1894116"/>
             <a:ext cx="3572729" cy="3617969"/>
           </a:xfrm>
           <a:prstGeom prst="rect">
@@ -8033,7 +8038,7 @@
             <a:pPr lvl="1"/>
             <a:r>
               <a:rPr lang="en-US" dirty="0" err="1"/>
-              <a:t>Lohrr</a:t>
+              <a:t>Lohr</a:t>
             </a:r>
             <a:r>
               <a:rPr lang="en-US" dirty="0"/>
@@ -8076,23 +8081,7 @@
                   <a:srgbClr val="FF0000"/>
                 </a:solidFill>
               </a:rPr>
-              <a:t>Deadline</a:t>
-            </a:r>
-            <a:r>
-              <a:rPr lang="en-US">
-                <a:solidFill>
-                  <a:srgbClr val="FF0000"/>
-                </a:solidFill>
-              </a:rPr>
-              <a:t>: 18 </a:t>
-            </a:r>
-            <a:r>
-              <a:rPr lang="en-US" dirty="0">
-                <a:solidFill>
-                  <a:srgbClr val="FF0000"/>
-                </a:solidFill>
-              </a:rPr>
-              <a:t>October 17:00</a:t>
+              <a:t>Deadline: 18 October 17:00</a:t>
             </a:r>
           </a:p>
           <a:p>
@@ -8221,7 +8210,7 @@
         </p:nvSpPr>
         <p:spPr>
           <a:xfrm>
-            <a:off x="539551" y="332656"/>
+            <a:off x="2063552" y="332657"/>
             <a:ext cx="2520281" cy="2031325"/>
           </a:xfrm>
           <a:prstGeom prst="rect">
@@ -8309,7 +8298,7 @@
         </p:nvSpPr>
         <p:spPr>
           <a:xfrm>
-            <a:off x="5076056" y="332656"/>
+            <a:off x="6600056" y="332656"/>
             <a:ext cx="2664296" cy="923330"/>
           </a:xfrm>
           <a:prstGeom prst="rect">
@@ -8367,7 +8356,7 @@
         </p:nvCxnSpPr>
         <p:spPr>
           <a:xfrm flipH="1">
-            <a:off x="3059832" y="794321"/>
+            <a:off x="4583832" y="794321"/>
             <a:ext cx="2016224" cy="553998"/>
           </a:xfrm>
           <a:prstGeom prst="straightConnector1">
@@ -8466,7 +8455,7 @@
         </p:nvSpPr>
         <p:spPr>
           <a:xfrm>
-            <a:off x="539551" y="332656"/>
+            <a:off x="2063552" y="332656"/>
             <a:ext cx="2160241" cy="923330"/>
           </a:xfrm>
           <a:prstGeom prst="rect">
@@ -8509,7 +8498,7 @@
         </p:nvSpPr>
         <p:spPr>
           <a:xfrm>
-            <a:off x="5076056" y="332656"/>
+            <a:off x="6600056" y="332656"/>
             <a:ext cx="2664296" cy="923330"/>
           </a:xfrm>
           <a:prstGeom prst="rect">
@@ -8563,7 +8552,7 @@
         </p:nvSpPr>
         <p:spPr>
           <a:xfrm>
-            <a:off x="4247963" y="1988839"/>
+            <a:off x="5771964" y="1988840"/>
             <a:ext cx="2160241" cy="646331"/>
           </a:xfrm>
           <a:prstGeom prst="rect">
@@ -8603,7 +8592,7 @@
         </p:nvSpPr>
         <p:spPr>
           <a:xfrm>
-            <a:off x="4247963" y="3105834"/>
+            <a:off x="5771964" y="3105834"/>
             <a:ext cx="2305237" cy="1477328"/>
           </a:xfrm>
           <a:prstGeom prst="rect">
@@ -8659,7 +8648,7 @@
         </p:nvCxnSpPr>
         <p:spPr>
           <a:xfrm flipH="1">
-            <a:off x="2699792" y="794321"/>
+            <a:off x="4223792" y="794321"/>
             <a:ext cx="2376264" cy="0"/>
           </a:xfrm>
           <a:prstGeom prst="straightConnector1">
@@ -8701,7 +8690,7 @@
         </p:nvCxnSpPr>
         <p:spPr>
           <a:xfrm>
-            <a:off x="3995936" y="794321"/>
+            <a:off x="5519936" y="794321"/>
             <a:ext cx="1332148" cy="1194518"/>
           </a:xfrm>
           <a:prstGeom prst="straightConnector1">
@@ -8742,7 +8731,7 @@
         </p:nvCxnSpPr>
         <p:spPr>
           <a:xfrm>
-            <a:off x="5328084" y="2635170"/>
+            <a:off x="6852084" y="2635170"/>
             <a:ext cx="0" cy="470664"/>
           </a:xfrm>
           <a:prstGeom prst="straightConnector1">
@@ -8840,7 +8829,7 @@
         </p:nvSpPr>
         <p:spPr>
           <a:xfrm>
-            <a:off x="539551" y="332656"/>
+            <a:off x="2063552" y="332656"/>
             <a:ext cx="2160241" cy="923330"/>
           </a:xfrm>
           <a:prstGeom prst="rect">
@@ -8883,7 +8872,7 @@
         </p:nvSpPr>
         <p:spPr>
           <a:xfrm>
-            <a:off x="5076056" y="332656"/>
+            <a:off x="6600056" y="332656"/>
             <a:ext cx="2664296" cy="923330"/>
           </a:xfrm>
           <a:prstGeom prst="rect">
@@ -8937,7 +8926,7 @@
         </p:nvSpPr>
         <p:spPr>
           <a:xfrm>
-            <a:off x="1835696" y="1988840"/>
+            <a:off x="3359697" y="1988841"/>
             <a:ext cx="2160241" cy="646331"/>
           </a:xfrm>
           <a:prstGeom prst="rect">
@@ -8980,7 +8969,7 @@
         </p:nvSpPr>
         <p:spPr>
           <a:xfrm>
-            <a:off x="1835695" y="3105834"/>
+            <a:off x="3359696" y="3105834"/>
             <a:ext cx="2160241" cy="1754326"/>
           </a:xfrm>
           <a:prstGeom prst="rect">
@@ -9060,7 +9049,7 @@
         </p:nvCxnSpPr>
         <p:spPr>
           <a:xfrm flipH="1">
-            <a:off x="2699792" y="794321"/>
+            <a:off x="4223792" y="794321"/>
             <a:ext cx="2376264" cy="0"/>
           </a:xfrm>
           <a:prstGeom prst="straightConnector1">
@@ -9102,7 +9091,7 @@
         </p:nvCxnSpPr>
         <p:spPr>
           <a:xfrm flipH="1">
-            <a:off x="2915817" y="794321"/>
+            <a:off x="4439818" y="794322"/>
             <a:ext cx="1080119" cy="1194519"/>
           </a:xfrm>
           <a:prstGeom prst="straightConnector1">
@@ -9141,7 +9130,7 @@
         </p:nvCxnSpPr>
         <p:spPr>
           <a:xfrm>
-            <a:off x="2915817" y="2635170"/>
+            <a:off x="4439817" y="2635170"/>
             <a:ext cx="0" cy="470664"/>
           </a:xfrm>
           <a:prstGeom prst="straightConnector1">
@@ -9239,7 +9228,7 @@
         </p:nvSpPr>
         <p:spPr>
           <a:xfrm>
-            <a:off x="539551" y="332656"/>
+            <a:off x="2063552" y="332656"/>
             <a:ext cx="2160241" cy="923330"/>
           </a:xfrm>
           <a:prstGeom prst="rect">
@@ -9282,7 +9271,7 @@
         </p:nvSpPr>
         <p:spPr>
           <a:xfrm>
-            <a:off x="5076056" y="332656"/>
+            <a:off x="6600056" y="332656"/>
             <a:ext cx="2664296" cy="923330"/>
           </a:xfrm>
           <a:prstGeom prst="rect">
@@ -9336,7 +9325,7 @@
         </p:nvSpPr>
         <p:spPr>
           <a:xfrm>
-            <a:off x="1835696" y="1988840"/>
+            <a:off x="3359697" y="1988841"/>
             <a:ext cx="2160241" cy="646331"/>
           </a:xfrm>
           <a:prstGeom prst="rect">
@@ -9379,7 +9368,7 @@
         </p:nvSpPr>
         <p:spPr>
           <a:xfrm>
-            <a:off x="1835695" y="3105834"/>
+            <a:off x="3359696" y="3105834"/>
             <a:ext cx="2160241" cy="1754326"/>
           </a:xfrm>
           <a:prstGeom prst="rect">
@@ -9456,7 +9445,7 @@
         </p:nvSpPr>
         <p:spPr>
           <a:xfrm>
-            <a:off x="1182041" y="5156021"/>
+            <a:off x="2706042" y="5156021"/>
             <a:ext cx="2817519" cy="923330"/>
           </a:xfrm>
           <a:prstGeom prst="rect">
@@ -9519,7 +9508,7 @@
         </p:nvCxnSpPr>
         <p:spPr>
           <a:xfrm flipH="1">
-            <a:off x="2699792" y="794321"/>
+            <a:off x="4223792" y="794321"/>
             <a:ext cx="2376264" cy="0"/>
           </a:xfrm>
           <a:prstGeom prst="straightConnector1">
@@ -9561,7 +9550,7 @@
         </p:nvCxnSpPr>
         <p:spPr>
           <a:xfrm flipH="1">
-            <a:off x="2915817" y="794321"/>
+            <a:off x="4439818" y="794322"/>
             <a:ext cx="1080119" cy="1194519"/>
           </a:xfrm>
           <a:prstGeom prst="straightConnector1">
@@ -9600,7 +9589,7 @@
         </p:nvCxnSpPr>
         <p:spPr>
           <a:xfrm>
-            <a:off x="2915817" y="2635170"/>
+            <a:off x="4439817" y="2635170"/>
             <a:ext cx="0" cy="470664"/>
           </a:xfrm>
           <a:prstGeom prst="straightConnector1">
@@ -9641,7 +9630,7 @@
         </p:nvCxnSpPr>
         <p:spPr>
           <a:xfrm>
-            <a:off x="2843808" y="4860160"/>
+            <a:off x="4367808" y="4860161"/>
             <a:ext cx="0" cy="309551"/>
           </a:xfrm>
           <a:prstGeom prst="straightConnector1">
@@ -9739,7 +9728,7 @@
         </p:nvSpPr>
         <p:spPr>
           <a:xfrm>
-            <a:off x="539551" y="332656"/>
+            <a:off x="2063552" y="332656"/>
             <a:ext cx="2160241" cy="923330"/>
           </a:xfrm>
           <a:prstGeom prst="rect">
@@ -9782,7 +9771,7 @@
         </p:nvSpPr>
         <p:spPr>
           <a:xfrm>
-            <a:off x="5076056" y="332656"/>
+            <a:off x="6600056" y="332656"/>
             <a:ext cx="2664296" cy="923330"/>
           </a:xfrm>
           <a:prstGeom prst="rect">
@@ -9836,7 +9825,7 @@
         </p:nvSpPr>
         <p:spPr>
           <a:xfrm>
-            <a:off x="1835696" y="1988840"/>
+            <a:off x="3359697" y="1988841"/>
             <a:ext cx="2160241" cy="646331"/>
           </a:xfrm>
           <a:prstGeom prst="rect">
@@ -9879,7 +9868,7 @@
         </p:nvSpPr>
         <p:spPr>
           <a:xfrm>
-            <a:off x="4247963" y="1988839"/>
+            <a:off x="5771964" y="1988840"/>
             <a:ext cx="2160241" cy="646331"/>
           </a:xfrm>
           <a:prstGeom prst="rect">
@@ -9919,7 +9908,7 @@
         </p:nvSpPr>
         <p:spPr>
           <a:xfrm>
-            <a:off x="1835695" y="3105834"/>
+            <a:off x="3359696" y="3105834"/>
             <a:ext cx="2160241" cy="1754326"/>
           </a:xfrm>
           <a:prstGeom prst="rect">
@@ -9996,7 +9985,7 @@
         </p:nvSpPr>
         <p:spPr>
           <a:xfrm>
-            <a:off x="1182041" y="5156021"/>
+            <a:off x="2706042" y="5156021"/>
             <a:ext cx="2817519" cy="923330"/>
           </a:xfrm>
           <a:prstGeom prst="rect">
@@ -10056,7 +10045,7 @@
         </p:nvSpPr>
         <p:spPr>
           <a:xfrm>
-            <a:off x="4247963" y="3105834"/>
+            <a:off x="5771964" y="3105834"/>
             <a:ext cx="2305237" cy="1477328"/>
           </a:xfrm>
           <a:prstGeom prst="rect">
@@ -10112,7 +10101,7 @@
         </p:nvCxnSpPr>
         <p:spPr>
           <a:xfrm flipH="1">
-            <a:off x="2699792" y="794321"/>
+            <a:off x="4223792" y="794321"/>
             <a:ext cx="2376264" cy="0"/>
           </a:xfrm>
           <a:prstGeom prst="straightConnector1">
@@ -10154,7 +10143,7 @@
         </p:nvCxnSpPr>
         <p:spPr>
           <a:xfrm flipH="1">
-            <a:off x="2915817" y="794321"/>
+            <a:off x="4439818" y="794322"/>
             <a:ext cx="1080119" cy="1194519"/>
           </a:xfrm>
           <a:prstGeom prst="straightConnector1">
@@ -10195,7 +10184,7 @@
         </p:nvCxnSpPr>
         <p:spPr>
           <a:xfrm>
-            <a:off x="3995936" y="794321"/>
+            <a:off x="5519936" y="794321"/>
             <a:ext cx="1332148" cy="1194518"/>
           </a:xfrm>
           <a:prstGeom prst="straightConnector1">
@@ -10236,7 +10225,7 @@
         </p:nvCxnSpPr>
         <p:spPr>
           <a:xfrm>
-            <a:off x="5328084" y="2635170"/>
+            <a:off x="6852084" y="2635170"/>
             <a:ext cx="0" cy="470664"/>
           </a:xfrm>
           <a:prstGeom prst="straightConnector1">
@@ -10275,7 +10264,7 @@
         </p:nvCxnSpPr>
         <p:spPr>
           <a:xfrm>
-            <a:off x="2915817" y="2635170"/>
+            <a:off x="4439817" y="2635170"/>
             <a:ext cx="0" cy="470664"/>
           </a:xfrm>
           <a:prstGeom prst="straightConnector1">
@@ -10316,7 +10305,7 @@
         </p:nvCxnSpPr>
         <p:spPr>
           <a:xfrm>
-            <a:off x="2843808" y="4860160"/>
+            <a:off x="4367808" y="4860161"/>
             <a:ext cx="0" cy="309551"/>
           </a:xfrm>
           <a:prstGeom prst="straightConnector1">
@@ -10405,7 +10394,7 @@
         </p:nvSpPr>
         <p:spPr>
           <a:xfrm>
-            <a:off x="457200" y="1600200"/>
+            <a:off x="1981200" y="1600200"/>
             <a:ext cx="8229600" cy="5069160"/>
           </a:xfrm>
         </p:spPr>
@@ -10420,9 +10409,32 @@
               <a:buAutoNum type="arabicPeriod"/>
             </a:pPr>
             <a:r>
-              <a:rPr lang="en-US" dirty="0"/>
-              <a:t>Other statistics </a:t>
-            </a:r>
+              <a:rPr lang="en-US" dirty="0" err="1"/>
+              <a:t>Hurvitz</a:t>
+            </a:r>
+            <a:r>
+              <a:rPr lang="en-US" dirty="0"/>
+              <a:t>-Thompson estimator</a:t>
+            </a:r>
+          </a:p>
+          <a:p>
+            <a:pPr marL="914400" lvl="1" indent="-514350"/>
+            <a:r>
+              <a:rPr lang="en-US" dirty="0"/>
+              <a:t>Design weights</a:t>
+            </a:r>
+          </a:p>
+          <a:p>
+            <a:pPr marL="914400" lvl="1" indent="-514350"/>
+            <a:r>
+              <a:rPr lang="en-US" dirty="0"/>
+              <a:t>Inclusion </a:t>
+            </a:r>
+            <a:r>
+              <a:rPr lang="en-US" dirty="0" err="1"/>
+              <a:t>robabilities</a:t>
+            </a:r>
+            <a:endParaRPr lang="en-US" dirty="0"/>
           </a:p>
           <a:p>
             <a:pPr marL="514350" indent="-514350">
@@ -10430,32 +10442,9 @@
               <a:buAutoNum type="arabicPeriod"/>
             </a:pPr>
             <a:r>
-              <a:rPr lang="en-US" dirty="0" err="1"/>
-              <a:t>Hurvitz</a:t>
-            </a:r>
-            <a:r>
-              <a:rPr lang="en-US" dirty="0"/>
-              <a:t>-Thompson estimator</a:t>
-            </a:r>
-          </a:p>
-          <a:p>
-            <a:pPr marL="914400" lvl="1" indent="-514350"/>
-            <a:r>
-              <a:rPr lang="en-US" dirty="0"/>
-              <a:t>Design weights</a:t>
-            </a:r>
-          </a:p>
-          <a:p>
-            <a:pPr marL="914400" lvl="1" indent="-514350"/>
-            <a:r>
-              <a:rPr lang="en-US" dirty="0"/>
-              <a:t>Inclusion </a:t>
-            </a:r>
-            <a:r>
-              <a:rPr lang="en-US" dirty="0" err="1"/>
-              <a:t>robabilities</a:t>
-            </a:r>
-            <a:endParaRPr lang="en-US" dirty="0"/>
+              <a:rPr lang="en-US" dirty="0"/>
+              <a:t>Stratified cluster samples</a:t>
+            </a:r>
           </a:p>
           <a:p>
             <a:pPr marL="514350" indent="-514350">
@@ -10464,7 +10453,7 @@
             </a:pPr>
             <a:r>
               <a:rPr lang="en-US" dirty="0"/>
-              <a:t>Stratified cluster samples</a:t>
+              <a:t>Other statistics </a:t>
             </a:r>
           </a:p>
           <a:p>

</xml_diff>

<commit_message>
week 6 - SDA
</commit_message>
<xml_diff>
--- a/static/files/SDA/week5/lecture_week_5.pptx
+++ b/static/files/SDA/week5/lecture_week_5.pptx
@@ -3874,8 +3874,8 @@
           <a:chExt cx="0" cy="0"/>
         </a:xfrm>
       </p:grpSpPr>
-      <mc:AlternateContent xmlns:mc="http://schemas.openxmlformats.org/markup-compatibility/2006">
-        <mc:Choice xmlns:a14="http://schemas.microsoft.com/office/drawing/2010/main" Requires="a14">
+      <mc:AlternateContent xmlns:mc="http://schemas.openxmlformats.org/markup-compatibility/2006" xmlns:a14="http://schemas.microsoft.com/office/drawing/2010/main">
+        <mc:Choice Requires="a14">
           <p:sp>
             <p:nvSpPr>
               <p:cNvPr id="3" name="Tijdelijke aanduiding voor inhoud 2"/>
@@ -4278,7 +4278,7 @@
             </p:txBody>
           </p:sp>
         </mc:Choice>
-        <mc:Fallback>
+        <mc:Fallback xmlns="">
           <p:sp>
             <p:nvSpPr>
               <p:cNvPr id="3" name="Tijdelijke aanduiding voor inhoud 2"/>
@@ -5150,14 +5150,14 @@
           </a:ln>
           <a:extLst>
             <a:ext uri="{909E8E84-426E-40dd-AFC4-6F175D3DCCD1}">
-              <a14:hiddenFill xmlns="" xmlns:a14="http://schemas.microsoft.com/office/drawing/2010/main">
+              <a14:hiddenFill xmlns:a14="http://schemas.microsoft.com/office/drawing/2010/main" xmlns="">
                 <a:solidFill>
                   <a:schemeClr val="accent1"/>
                 </a:solidFill>
               </a14:hiddenFill>
             </a:ext>
             <a:ext uri="{91240B29-F687-4f45-9708-019B960494DF}">
-              <a14:hiddenLine xmlns="" xmlns:a14="http://schemas.microsoft.com/office/drawing/2010/main" w="9525">
+              <a14:hiddenLine xmlns:a14="http://schemas.microsoft.com/office/drawing/2010/main" xmlns="" w="9525">
                 <a:solidFill>
                   <a:schemeClr val="tx1"/>
                 </a:solidFill>
@@ -5391,14 +5391,14 @@
           </a:ln>
           <a:extLst>
             <a:ext uri="{909E8E84-426E-40dd-AFC4-6F175D3DCCD1}">
-              <a14:hiddenFill xmlns="" xmlns:a14="http://schemas.microsoft.com/office/drawing/2010/main">
+              <a14:hiddenFill xmlns:a14="http://schemas.microsoft.com/office/drawing/2010/main" xmlns="">
                 <a:solidFill>
                   <a:schemeClr val="accent1"/>
                 </a:solidFill>
               </a14:hiddenFill>
             </a:ext>
             <a:ext uri="{91240B29-F687-4f45-9708-019B960494DF}">
-              <a14:hiddenLine xmlns="" xmlns:a14="http://schemas.microsoft.com/office/drawing/2010/main" w="9525">
+              <a14:hiddenLine xmlns:a14="http://schemas.microsoft.com/office/drawing/2010/main" xmlns="" w="9525">
                 <a:solidFill>
                   <a:schemeClr val="tx1"/>
                 </a:solidFill>
@@ -5585,14 +5585,14 @@
           </a:ln>
           <a:extLst>
             <a:ext uri="{909E8E84-426E-40dd-AFC4-6F175D3DCCD1}">
-              <a14:hiddenFill xmlns="" xmlns:a14="http://schemas.microsoft.com/office/drawing/2010/main">
+              <a14:hiddenFill xmlns:a14="http://schemas.microsoft.com/office/drawing/2010/main" xmlns="">
                 <a:solidFill>
                   <a:schemeClr val="accent1"/>
                 </a:solidFill>
               </a14:hiddenFill>
             </a:ext>
             <a:ext uri="{91240B29-F687-4f45-9708-019B960494DF}">
-              <a14:hiddenLine xmlns="" xmlns:a14="http://schemas.microsoft.com/office/drawing/2010/main" w="9525">
+              <a14:hiddenLine xmlns:a14="http://schemas.microsoft.com/office/drawing/2010/main" xmlns="" w="9525">
                 <a:solidFill>
                   <a:schemeClr val="tx1"/>
                 </a:solidFill>
@@ -5941,14 +5941,14 @@
           </a:ln>
           <a:extLst>
             <a:ext uri="{909E8E84-426E-40dd-AFC4-6F175D3DCCD1}">
-              <a14:hiddenFill xmlns="" xmlns:a14="http://schemas.microsoft.com/office/drawing/2010/main">
+              <a14:hiddenFill xmlns:a14="http://schemas.microsoft.com/office/drawing/2010/main" xmlns="">
                 <a:solidFill>
                   <a:schemeClr val="accent1"/>
                 </a:solidFill>
               </a14:hiddenFill>
             </a:ext>
             <a:ext uri="{91240B29-F687-4f45-9708-019B960494DF}">
-              <a14:hiddenLine xmlns="" xmlns:a14="http://schemas.microsoft.com/office/drawing/2010/main" w="9525">
+              <a14:hiddenLine xmlns:a14="http://schemas.microsoft.com/office/drawing/2010/main" xmlns="" w="9525">
                 <a:solidFill>
                   <a:schemeClr val="tx1"/>
                 </a:solidFill>
@@ -6299,14 +6299,14 @@
           </a:ln>
           <a:extLst>
             <a:ext uri="{909E8E84-426E-40dd-AFC4-6F175D3DCCD1}">
-              <a14:hiddenFill xmlns="" xmlns:a14="http://schemas.microsoft.com/office/drawing/2010/main">
+              <a14:hiddenFill xmlns:a14="http://schemas.microsoft.com/office/drawing/2010/main" xmlns="">
                 <a:solidFill>
                   <a:schemeClr val="accent1"/>
                 </a:solidFill>
               </a14:hiddenFill>
             </a:ext>
             <a:ext uri="{91240B29-F687-4f45-9708-019B960494DF}">
-              <a14:hiddenLine xmlns="" xmlns:a14="http://schemas.microsoft.com/office/drawing/2010/main" w="9525">
+              <a14:hiddenLine xmlns:a14="http://schemas.microsoft.com/office/drawing/2010/main" xmlns="" w="9525">
                 <a:solidFill>
                   <a:schemeClr val="tx1"/>
                 </a:solidFill>
@@ -6776,14 +6776,14 @@
           </a:ln>
           <a:extLst>
             <a:ext uri="{909E8E84-426E-40dd-AFC4-6F175D3DCCD1}">
-              <a14:hiddenFill xmlns="" xmlns:a14="http://schemas.microsoft.com/office/drawing/2010/main">
+              <a14:hiddenFill xmlns:a14="http://schemas.microsoft.com/office/drawing/2010/main" xmlns="">
                 <a:solidFill>
                   <a:schemeClr val="accent1"/>
                 </a:solidFill>
               </a14:hiddenFill>
             </a:ext>
             <a:ext uri="{91240B29-F687-4f45-9708-019B960494DF}">
-              <a14:hiddenLine xmlns="" xmlns:a14="http://schemas.microsoft.com/office/drawing/2010/main" w="9525">
+              <a14:hiddenLine xmlns:a14="http://schemas.microsoft.com/office/drawing/2010/main" xmlns="" w="9525">
                 <a:solidFill>
                   <a:schemeClr val="tx1"/>
                 </a:solidFill>
@@ -7408,12 +7408,18 @@
         </p:spPr>
         <p:txBody>
           <a:bodyPr>
-            <a:normAutofit lnSpcReduction="10000"/>
+            <a:normAutofit fontScale="92500" lnSpcReduction="20000"/>
           </a:bodyPr>
           <a:lstStyle/>
           <a:p>
             <a:r>
               <a:rPr lang="en-US" dirty="0"/>
+              <a:t>Assignment 1 – form pairs</a:t>
+            </a:r>
+          </a:p>
+          <a:p>
+            <a:r>
+              <a:rPr lang="en-US" dirty="0"/>
               <a:t>Discuss take home exercise</a:t>
             </a:r>
           </a:p>
@@ -7428,13 +7434,8 @@
             <a:pPr lvl="1"/>
             <a:r>
               <a:rPr lang="en-US" dirty="0"/>
-              <a:t>Questions: what do </a:t>
-            </a:r>
-            <a:r>
-              <a:rPr lang="en-US"/>
-              <a:t>you encounter?</a:t>
-            </a:r>
-            <a:endParaRPr lang="en-US" dirty="0"/>
+              <a:t>Questions: what do you encounter?</a:t>
+            </a:r>
           </a:p>
           <a:p>
             <a:r>
@@ -7628,14 +7629,14 @@
           </a:ln>
           <a:extLst>
             <a:ext uri="{909E8E84-426E-40dd-AFC4-6F175D3DCCD1}">
-              <a14:hiddenFill xmlns="" xmlns:a14="http://schemas.microsoft.com/office/drawing/2010/main">
+              <a14:hiddenFill xmlns:a14="http://schemas.microsoft.com/office/drawing/2010/main" xmlns="">
                 <a:solidFill>
                   <a:schemeClr val="accent1"/>
                 </a:solidFill>
               </a14:hiddenFill>
             </a:ext>
             <a:ext uri="{91240B29-F687-4f45-9708-019B960494DF}">
-              <a14:hiddenLine xmlns="" xmlns:a14="http://schemas.microsoft.com/office/drawing/2010/main" w="9525">
+              <a14:hiddenLine xmlns:a14="http://schemas.microsoft.com/office/drawing/2010/main" xmlns="" w="9525">
                 <a:solidFill>
                   <a:schemeClr val="tx1"/>
                 </a:solidFill>
@@ -7682,14 +7683,14 @@
           </a:ln>
           <a:extLst>
             <a:ext uri="{909E8E84-426E-40dd-AFC4-6F175D3DCCD1}">
-              <a14:hiddenFill xmlns="" xmlns:a14="http://schemas.microsoft.com/office/drawing/2010/main">
+              <a14:hiddenFill xmlns:a14="http://schemas.microsoft.com/office/drawing/2010/main" xmlns="">
                 <a:solidFill>
                   <a:schemeClr val="accent1"/>
                 </a:solidFill>
               </a14:hiddenFill>
             </a:ext>
             <a:ext uri="{91240B29-F687-4f45-9708-019B960494DF}">
-              <a14:hiddenLine xmlns="" xmlns:a14="http://schemas.microsoft.com/office/drawing/2010/main" w="9525">
+              <a14:hiddenLine xmlns:a14="http://schemas.microsoft.com/office/drawing/2010/main" xmlns="" w="9525">
                 <a:solidFill>
                   <a:schemeClr val="tx1"/>
                 </a:solidFill>
@@ -10428,13 +10429,8 @@
             <a:pPr marL="914400" lvl="1" indent="-514350"/>
             <a:r>
               <a:rPr lang="en-US" dirty="0"/>
-              <a:t>Inclusion </a:t>
-            </a:r>
-            <a:r>
-              <a:rPr lang="en-US" dirty="0" err="1"/>
-              <a:t>robabilities</a:t>
-            </a:r>
-            <a:endParaRPr lang="en-US" dirty="0"/>
+              <a:t>Inclusion probabilities</a:t>
+            </a:r>
           </a:p>
           <a:p>
             <a:pPr marL="514350" indent="-514350">

</xml_diff>